<commit_message>
Removed  ## from anom-talk
</commit_message>
<xml_diff>
--- a/anom/anom-talk.pptx
+++ b/anom/anom-talk.pptx
@@ -29542,7 +29542,7 @@
               <a:rPr>
                 <a:latin typeface="Courier"/>
               </a:rPr>
-              <a:t>## Position 1</a:t>
+              <a:t>Position 1</a:t>
             </a:r>
           </a:p>
           <a:p>
@@ -29553,11 +29553,11 @@
               <a:rPr>
                 <a:latin typeface="Courier"/>
               </a:rPr>
-              <a:t>## -0.02386 -0.02853
-## -0.03001 -0.00428
-## -0.03623 -0.04222
-## -0.00144 -0.06466
-## 0.00944 -0.00163</a:t>
+              <a:t>-0.02386 -0.02853
+-0.03001 -0.00428
+-0.03623 -0.04222
+-0.00144 -0.06466
+0.00944 -0.00163</a:t>
             </a:r>
           </a:p>
         </p:txBody>
@@ -29647,7 +29647,7 @@
               <a:rPr>
                 <a:latin typeface="Courier"/>
               </a:rPr>
-              <a:t>## Position 2</a:t>
+              <a:t>Position 2</a:t>
             </a:r>
           </a:p>
           <a:p>
@@ -29658,11 +29658,11 @@
               <a:rPr>
                 <a:latin typeface="Courier"/>
               </a:rPr>
-              <a:t>## -0.02014 -0.02725
-## 0.02268 -0.03323
-## 0.03661 0.04378
-## 0.05562 0.00977
-## 0.05641 0.01816</a:t>
+              <a:t>-0.02014 -0.02725
+0.02268 -0.03323
+0.03661 0.04378
+0.05562 0.00977
+0.05641 0.01816</a:t>
             </a:r>
           </a:p>
         </p:txBody>
@@ -29971,13 +29971,13 @@
               <a:rPr>
                 <a:latin typeface="Courier"/>
               </a:rPr>
-              <a:t>##   position    avg stdev
-## 1        1 -0.022 0.023
-## 2        2  0.016 0.033
-## 3        3  0.006 0.029
-## 4        4  0.065 0.021
-## 5        5  0.008 0.026
-## 6        6 -0.013 0.016</a:t>
+              <a:t>  position    avg stdev
+1        1 -0.022 0.023
+2        2  0.016 0.033
+3        3  0.006 0.029
+4        4  0.065 0.021
+5        5  0.008 0.026
+6        6 -0.013 0.016</a:t>
             </a:r>
           </a:p>
         </p:txBody>
@@ -30176,8 +30176,8 @@
               <a:rPr>
                 <a:latin typeface="Courier"/>
               </a:rPr>
-              <a:t>##    avg    sp
-## 1 0.01 0.025</a:t>
+              <a:t>   avg    sp
+1 0.01 0.025</a:t>
             </a:r>
           </a:p>
         </p:txBody>
@@ -31203,13 +31203,13 @@
               <a:rPr>
                 <a:latin typeface="Courier"/>
               </a:rPr>
-              <a:t>##   group c_sections births
-## 1    1A        150    923
-## 2    1K         45    298
-## 3    1B         34    170
-## 4    1D         18    132
-## 5    3I         20    106
-## 6    3M         12    105</a:t>
+              <a:t>  group c_sections births
+1    1A        150    923
+2    1K         45    298
+3    1B         34    170
+4    1D         18    132
+5    3I         20    106
+6    3M         12    105</a:t>
             </a:r>
           </a:p>
         </p:txBody>
@@ -31921,12 +31921,12 @@
               <a:rPr>
                 <a:latin typeface="Courier"/>
               </a:rPr>
-              <a:t>##   clinic cat_scans members
-## 1      1        50  26.838
-## 2      2        71  26.895
-## 3      3        41  26.142
-## 4      4        62  25.907
-## 5      5        89  26.565</a:t>
+              <a:t>  clinic cat_scans members
+1      1        50  26.838
+2      2        71  26.895
+3      3        41  26.142
+4      4        62  25.907
+5      5        89  26.565</a:t>
             </a:r>
           </a:p>
           <a:p>
@@ -33973,8 +33973,8 @@
               <a:rPr>
                 <a:latin typeface="Courier"/>
               </a:rPr>
-              <a:t>## png 
-##   2</a:t>
+              <a:t>png 
+  2 </a:t>
             </a:r>
           </a:p>
         </p:txBody>

</xml_diff>